<commit_message>
Updating paths for 9.4.7 release
</commit_message>
<xml_diff>
--- a/image-sources/o16n-image-source-modern-policy-servicing.pptx
+++ b/image-sources/o16n-image-source-modern-policy-servicing.pptx
@@ -381,7 +381,7 @@
               <a:rPr lang="en-US" smtClean="0">
                 <a:latin typeface="Segoe UI" pitchFamily="34" charset="0"/>
               </a:rPr>
-              <a:t>5/23/2019 10:15 AM</a:t>
+              <a:t>7/30/2019 11:45 AM</a:t>
             </a:fld>
             <a:endParaRPr lang="en-US" dirty="0">
               <a:latin typeface="Segoe UI" pitchFamily="34" charset="0"/>
@@ -678,7 +678,7 @@
           <a:p>
             <a:fld id="{38EEC551-8CDA-4EB6-89BB-2A86C9F091C8}" type="datetime8">
               <a:rPr lang="en-US" smtClean="0"/>
-              <a:t>5/23/2019 10:14 AM</a:t>
+              <a:t>7/30/2019 11:45 AM</a:t>
             </a:fld>
             <a:endParaRPr lang="en-US" dirty="0"/>
           </a:p>
@@ -1065,7 +1065,7 @@
           <a:p>
             <a:fld id="{38EEC551-8CDA-4EB6-89BB-2A86C9F091C8}" type="datetime8">
               <a:rPr lang="en-US" smtClean="0"/>
-              <a:t>5/23/2019 10:14 AM</a:t>
+              <a:t>7/30/2019 11:45 AM</a:t>
             </a:fld>
             <a:endParaRPr lang="en-US" dirty="0"/>
           </a:p>
@@ -1368,7 +1368,7 @@
                 <a:tabLst/>
                 <a:defRPr/>
               </a:pPr>
-              <a:t>5/23/2019 10:57 AM</a:t>
+              <a:t>7/30/2019 11:45 AM</a:t>
             </a:fld>
             <a:endParaRPr kumimoji="0" lang="en-US" sz="1200" b="0" i="0" u="none" strike="noStrike" kern="1200" cap="none" spc="0" normalizeH="0" baseline="0" noProof="0" dirty="0">
               <a:ln>
@@ -1743,7 +1743,7 @@
                 <a:tabLst/>
                 <a:defRPr/>
               </a:pPr>
-              <a:t>5/23/2019 10:57 AM</a:t>
+              <a:t>7/30/2019 11:45 AM</a:t>
             </a:fld>
             <a:endParaRPr kumimoji="0" lang="en-US" sz="1200" b="0" i="0" u="none" strike="noStrike" kern="1200" cap="none" spc="0" normalizeH="0" baseline="0" noProof="0" dirty="0">
               <a:ln>
@@ -2000,7 +2000,7 @@
           <a:p>
             <a:fld id="{38EEC551-8CDA-4EB6-89BB-2A86C9F091C8}" type="datetime8">
               <a:rPr lang="en-US" smtClean="0"/>
-              <a:t>5/23/2019 10:14 AM</a:t>
+              <a:t>7/30/2019 11:45 AM</a:t>
             </a:fld>
             <a:endParaRPr lang="en-US" dirty="0"/>
           </a:p>
@@ -18607,7 +18607,7 @@
               <a:defRPr/>
             </a:pPr>
             <a:r>
-              <a:rPr kumimoji="0" lang="en-US" sz="2000" b="1" i="0" u="none" strike="noStrike" kern="0" cap="none" spc="0" normalizeH="0" baseline="0" noProof="0" dirty="0">
+              <a:rPr kumimoji="0" lang="en-US" sz="2000" b="1" i="0" u="none" strike="noStrike" kern="0" cap="none" spc="0" normalizeH="0" baseline="0" noProof="0">
                 <a:ln>
                   <a:noFill/>
                 </a:ln>
@@ -18621,8 +18621,22 @@
                 <a:ea typeface="+mn-ea"/>
                 <a:cs typeface="+mn-cs"/>
               </a:rPr>
-              <a:t>9.4.0</a:t>
+              <a:t>9.4.7</a:t>
             </a:r>
+            <a:endParaRPr kumimoji="0" lang="en-US" sz="2000" b="1" i="0" u="none" strike="noStrike" kern="0" cap="none" spc="0" normalizeH="0" baseline="0" noProof="0" dirty="0">
+              <a:ln>
+                <a:noFill/>
+              </a:ln>
+              <a:solidFill>
+                <a:srgbClr val="505050"/>
+              </a:solidFill>
+              <a:effectLst/>
+              <a:uLnTx/>
+              <a:uFillTx/>
+              <a:latin typeface="Segoe UI"/>
+              <a:ea typeface="+mn-ea"/>
+              <a:cs typeface="+mn-cs"/>
+            </a:endParaRPr>
           </a:p>
         </p:txBody>
       </p:sp>
@@ -20422,7 +20436,7 @@
         </p:nvGrpSpPr>
         <p:grpSpPr>
           <a:xfrm>
-            <a:off x="6878615" y="5490490"/>
+            <a:off x="7205185" y="5490490"/>
             <a:ext cx="4313999" cy="578211"/>
             <a:chOff x="2984325" y="784386"/>
             <a:chExt cx="4313999" cy="578211"/>

</xml_diff>

<commit_message>
Updating support graphic for MLServer 9.4.7 release
</commit_message>
<xml_diff>
--- a/image-sources/o16n-image-source-modern-policy-servicing.pptx
+++ b/image-sources/o16n-image-source-modern-policy-servicing.pptx
@@ -381,7 +381,7 @@
               <a:rPr lang="en-US" smtClean="0">
                 <a:latin typeface="Segoe UI" pitchFamily="34" charset="0"/>
               </a:rPr>
-              <a:t>7/30/2019 11:45 AM</a:t>
+              <a:t>7/30/2019 11:49 AM</a:t>
             </a:fld>
             <a:endParaRPr lang="en-US" dirty="0">
               <a:latin typeface="Segoe UI" pitchFamily="34" charset="0"/>
@@ -678,7 +678,7 @@
           <a:p>
             <a:fld id="{38EEC551-8CDA-4EB6-89BB-2A86C9F091C8}" type="datetime8">
               <a:rPr lang="en-US" smtClean="0"/>
-              <a:t>7/30/2019 11:45 AM</a:t>
+              <a:t>7/30/2019 11:49 AM</a:t>
             </a:fld>
             <a:endParaRPr lang="en-US" dirty="0"/>
           </a:p>
@@ -1065,7 +1065,7 @@
           <a:p>
             <a:fld id="{38EEC551-8CDA-4EB6-89BB-2A86C9F091C8}" type="datetime8">
               <a:rPr lang="en-US" smtClean="0"/>
-              <a:t>7/30/2019 11:45 AM</a:t>
+              <a:t>7/30/2019 11:49 AM</a:t>
             </a:fld>
             <a:endParaRPr lang="en-US" dirty="0"/>
           </a:p>
@@ -1368,7 +1368,7 @@
                 <a:tabLst/>
                 <a:defRPr/>
               </a:pPr>
-              <a:t>7/30/2019 11:45 AM</a:t>
+              <a:t>7/30/2019 11:49 AM</a:t>
             </a:fld>
             <a:endParaRPr kumimoji="0" lang="en-US" sz="1200" b="0" i="0" u="none" strike="noStrike" kern="1200" cap="none" spc="0" normalizeH="0" baseline="0" noProof="0" dirty="0">
               <a:ln>
@@ -1743,7 +1743,7 @@
                 <a:tabLst/>
                 <a:defRPr/>
               </a:pPr>
-              <a:t>7/30/2019 11:45 AM</a:t>
+              <a:t>7/30/2019 11:49 AM</a:t>
             </a:fld>
             <a:endParaRPr kumimoji="0" lang="en-US" sz="1200" b="0" i="0" u="none" strike="noStrike" kern="1200" cap="none" spc="0" normalizeH="0" baseline="0" noProof="0" dirty="0">
               <a:ln>
@@ -2000,7 +2000,7 @@
           <a:p>
             <a:fld id="{38EEC551-8CDA-4EB6-89BB-2A86C9F091C8}" type="datetime8">
               <a:rPr lang="en-US" smtClean="0"/>
-              <a:t>7/30/2019 11:45 AM</a:t>
+              <a:t>7/30/2019 11:49 AM</a:t>
             </a:fld>
             <a:endParaRPr lang="en-US" dirty="0"/>
           </a:p>
@@ -20436,7 +20436,7 @@
         </p:nvGrpSpPr>
         <p:grpSpPr>
           <a:xfrm>
-            <a:off x="7205185" y="5490490"/>
+            <a:off x="7041901" y="5490490"/>
             <a:ext cx="4313999" cy="578211"/>
             <a:chOff x="2984325" y="784386"/>
             <a:chExt cx="4313999" cy="578211"/>
@@ -22427,6 +22427,34 @@
 </file>
 
 <file path=customXml/item1.xml><?xml version="1.0" encoding="utf-8"?>
+<p:properties xmlns:p="http://schemas.microsoft.com/office/2006/metadata/properties" xmlns:xsi="http://www.w3.org/2001/XMLSchema-instance" xmlns:pc="http://schemas.microsoft.com/office/infopath/2007/PartnerControls">
+  <documentManagement>
+    <_ip_UnifiedCompliancePolicyUIAction xmlns="http://schemas.microsoft.com/sharepoint/v3" xsi:nil="true"/>
+    <_ip_UnifiedCompliancePolicyProperties xmlns="http://schemas.microsoft.com/sharepoint/v3" xsi:nil="true"/>
+    <SharedWithUsers xmlns="b1dcf5e4-b140-464e-ad28-2eb3e755d828">
+      <UserInfo>
+        <DisplayName>Nati Nimni</DisplayName>
+        <AccountId>5713</AccountId>
+        <AccountType/>
+      </UserInfo>
+      <UserInfo>
+        <DisplayName>Heheng Li</DisplayName>
+        <AccountId>1938</AccountId>
+        <AccountType/>
+      </UserInfo>
+      <UserInfo>
+        <DisplayName>Josee Martens</DisplayName>
+        <AccountId>58</AccountId>
+        <AccountType/>
+      </UserInfo>
+    </SharedWithUsers>
+    <LastSharedByUser xmlns="ed478a9f-b709-4468-8a86-34ec96f55872">zhnan@microsoft.com</LastSharedByUser>
+    <LastSharedByTime xmlns="b1dcf5e4-b140-464e-ad28-2eb3e755d828">2017-04-22T00:50:26+00:00</LastSharedByTime>
+  </documentManagement>
+</p:properties>
+</file>
+
+<file path=customXml/item2.xml><?xml version="1.0" encoding="utf-8"?>
 <ct:contentTypeSchema xmlns:ct="http://schemas.microsoft.com/office/2006/metadata/contentType" xmlns:ma="http://schemas.microsoft.com/office/2006/metadata/properties/metaAttributes" ct:_="" ma:_="" ma:contentTypeName="Document" ma:contentTypeID="0x01010087F04871385379499F2DE2943CF3F531" ma:contentTypeVersion="8" ma:contentTypeDescription="Create a new document." ma:contentTypeScope="" ma:versionID="23ba5913d9e36477a641533005753569">
   <xsd:schema xmlns:xsd="http://www.w3.org/2001/XMLSchema" xmlns:xs="http://www.w3.org/2001/XMLSchema" xmlns:p="http://schemas.microsoft.com/office/2006/metadata/properties" xmlns:ns1="http://schemas.microsoft.com/sharepoint/v3" xmlns:ns2="b1dcf5e4-b140-464e-ad28-2eb3e755d828" xmlns:ns3="ed478a9f-b709-4468-8a86-34ec96f55872" xmlns:ns4="1f5ecd6e-98aa-4646-bfe6-99acd4bfa1f2" targetNamespace="http://schemas.microsoft.com/office/2006/metadata/properties" ma:root="true" ma:fieldsID="7a6cd43b5496def1ba34c7eaf1d46397" ns1:_="" ns2:_="" ns3:_="" ns4:_="">
     <xsd:import namespace="http://schemas.microsoft.com/sharepoint/v3"/>
@@ -22627,34 +22655,6 @@
 </ct:contentTypeSchema>
 </file>
 
-<file path=customXml/item2.xml><?xml version="1.0" encoding="utf-8"?>
-<p:properties xmlns:p="http://schemas.microsoft.com/office/2006/metadata/properties" xmlns:xsi="http://www.w3.org/2001/XMLSchema-instance" xmlns:pc="http://schemas.microsoft.com/office/infopath/2007/PartnerControls">
-  <documentManagement>
-    <_ip_UnifiedCompliancePolicyUIAction xmlns="http://schemas.microsoft.com/sharepoint/v3" xsi:nil="true"/>
-    <_ip_UnifiedCompliancePolicyProperties xmlns="http://schemas.microsoft.com/sharepoint/v3" xsi:nil="true"/>
-    <SharedWithUsers xmlns="b1dcf5e4-b140-464e-ad28-2eb3e755d828">
-      <UserInfo>
-        <DisplayName>Nati Nimni</DisplayName>
-        <AccountId>5713</AccountId>
-        <AccountType/>
-      </UserInfo>
-      <UserInfo>
-        <DisplayName>Heheng Li</DisplayName>
-        <AccountId>1938</AccountId>
-        <AccountType/>
-      </UserInfo>
-      <UserInfo>
-        <DisplayName>Josee Martens</DisplayName>
-        <AccountId>58</AccountId>
-        <AccountType/>
-      </UserInfo>
-    </SharedWithUsers>
-    <LastSharedByUser xmlns="ed478a9f-b709-4468-8a86-34ec96f55872">zhnan@microsoft.com</LastSharedByUser>
-    <LastSharedByTime xmlns="b1dcf5e4-b140-464e-ad28-2eb3e755d828">2017-04-22T00:50:26+00:00</LastSharedByTime>
-  </documentManagement>
-</p:properties>
-</file>
-
 <file path=customXml/item3.xml><?xml version="1.0" encoding="utf-8"?>
 <?mso-contentType ?>
 <FormTemplates xmlns="http://schemas.microsoft.com/sharepoint/v3/contenttype/forms">
@@ -22665,6 +22665,25 @@
 </file>
 
 <file path=customXml/itemProps1.xml><?xml version="1.0" encoding="utf-8"?>
+<ds:datastoreItem xmlns:ds="http://schemas.openxmlformats.org/officeDocument/2006/customXml" ds:itemID="{F990F116-B58F-4255-B05B-DA3808E0E5C6}">
+  <ds:schemaRefs>
+    <ds:schemaRef ds:uri="http://purl.org/dc/elements/1.1/"/>
+    <ds:schemaRef ds:uri="http://purl.org/dc/terms/"/>
+    <ds:schemaRef ds:uri="http://schemas.microsoft.com/office/infopath/2007/PartnerControls"/>
+    <ds:schemaRef ds:uri="http://schemas.openxmlformats.org/package/2006/metadata/core-properties"/>
+    <ds:schemaRef ds:uri="http://purl.org/dc/dcmitype/"/>
+    <ds:schemaRef ds:uri="http://schemas.microsoft.com/office/2006/documentManagement/types"/>
+    <ds:schemaRef ds:uri="1f5ecd6e-98aa-4646-bfe6-99acd4bfa1f2"/>
+    <ds:schemaRef ds:uri="b1dcf5e4-b140-464e-ad28-2eb3e755d828"/>
+    <ds:schemaRef ds:uri="ed478a9f-b709-4468-8a86-34ec96f55872"/>
+    <ds:schemaRef ds:uri="http://schemas.microsoft.com/sharepoint/v3"/>
+    <ds:schemaRef ds:uri="http://schemas.microsoft.com/office/2006/metadata/properties"/>
+    <ds:schemaRef ds:uri="http://www.w3.org/XML/1998/namespace"/>
+  </ds:schemaRefs>
+</ds:datastoreItem>
+</file>
+
+<file path=customXml/itemProps2.xml><?xml version="1.0" encoding="utf-8"?>
 <ds:datastoreItem xmlns:ds="http://schemas.openxmlformats.org/officeDocument/2006/customXml" ds:itemID="{D6A11D20-54FC-4878-9A84-9CD43625A856}">
   <ds:schemaRefs>
     <ds:schemaRef ds:uri="http://schemas.microsoft.com/office/2006/metadata/contentType"/>
@@ -22685,25 +22704,6 @@
 </ds:datastoreItem>
 </file>
 
-<file path=customXml/itemProps2.xml><?xml version="1.0" encoding="utf-8"?>
-<ds:datastoreItem xmlns:ds="http://schemas.openxmlformats.org/officeDocument/2006/customXml" ds:itemID="{F990F116-B58F-4255-B05B-DA3808E0E5C6}">
-  <ds:schemaRefs>
-    <ds:schemaRef ds:uri="http://purl.org/dc/elements/1.1/"/>
-    <ds:schemaRef ds:uri="http://purl.org/dc/terms/"/>
-    <ds:schemaRef ds:uri="http://schemas.microsoft.com/office/infopath/2007/PartnerControls"/>
-    <ds:schemaRef ds:uri="http://schemas.openxmlformats.org/package/2006/metadata/core-properties"/>
-    <ds:schemaRef ds:uri="http://purl.org/dc/dcmitype/"/>
-    <ds:schemaRef ds:uri="http://schemas.microsoft.com/office/2006/documentManagement/types"/>
-    <ds:schemaRef ds:uri="1f5ecd6e-98aa-4646-bfe6-99acd4bfa1f2"/>
-    <ds:schemaRef ds:uri="b1dcf5e4-b140-464e-ad28-2eb3e755d828"/>
-    <ds:schemaRef ds:uri="ed478a9f-b709-4468-8a86-34ec96f55872"/>
-    <ds:schemaRef ds:uri="http://schemas.microsoft.com/sharepoint/v3"/>
-    <ds:schemaRef ds:uri="http://schemas.microsoft.com/office/2006/metadata/properties"/>
-    <ds:schemaRef ds:uri="http://www.w3.org/XML/1998/namespace"/>
-  </ds:schemaRefs>
-</ds:datastoreItem>
-</file>
-
 <file path=customXml/itemProps3.xml><?xml version="1.0" encoding="utf-8"?>
 <ds:datastoreItem xmlns:ds="http://schemas.openxmlformats.org/officeDocument/2006/customXml" ds:itemID="{758FDAC0-319D-4A54-8D8E-1D42CB1F8004}">
   <ds:schemaRefs>

</xml_diff>

<commit_message>
Increased font in image
</commit_message>
<xml_diff>
--- a/image-sources/o16n-image-source-modern-policy-servicing.pptx
+++ b/image-sources/o16n-image-source-modern-policy-servicing.pptx
@@ -382,7 +382,7 @@
               <a:rPr lang="en-US" smtClean="0">
                 <a:latin typeface="Segoe UI" pitchFamily="34" charset="0"/>
               </a:rPr>
-              <a:t>5/20/2021 9:53 AM</a:t>
+              <a:t>5/20/2021 10:51 AM</a:t>
             </a:fld>
             <a:endParaRPr lang="en-US" dirty="0">
               <a:latin typeface="Segoe UI" pitchFamily="34" charset="0"/>
@@ -679,7 +679,7 @@
           <a:p>
             <a:fld id="{38EEC551-8CDA-4EB6-89BB-2A86C9F091C8}" type="datetime8">
               <a:rPr lang="en-US" smtClean="0"/>
-              <a:t>5/20/2021 9:52 AM</a:t>
+              <a:t>5/20/2021 10:50 AM</a:t>
             </a:fld>
             <a:endParaRPr lang="en-US" dirty="0"/>
           </a:p>
@@ -1071,7 +1071,7 @@
           <a:p>
             <a:fld id="{38EEC551-8CDA-4EB6-89BB-2A86C9F091C8}" type="datetime8">
               <a:rPr lang="en-US" smtClean="0"/>
-              <a:t>5/20/2021 9:52 AM</a:t>
+              <a:t>5/20/2021 10:50 AM</a:t>
             </a:fld>
             <a:endParaRPr lang="en-US" dirty="0"/>
           </a:p>
@@ -1379,7 +1379,7 @@
                 <a:tabLst/>
                 <a:defRPr/>
               </a:pPr>
-              <a:t>5/20/2021 9:52 AM</a:t>
+              <a:t>5/20/2021 10:50 AM</a:t>
             </a:fld>
             <a:endParaRPr kumimoji="0" lang="en-US" sz="1200" b="0" i="0" u="none" strike="noStrike" kern="1200" cap="none" spc="0" normalizeH="0" baseline="0" noProof="0" dirty="0">
               <a:ln>
@@ -1759,7 +1759,7 @@
                 <a:tabLst/>
                 <a:defRPr/>
               </a:pPr>
-              <a:t>5/20/2021 9:52 AM</a:t>
+              <a:t>5/20/2021 10:50 AM</a:t>
             </a:fld>
             <a:endParaRPr kumimoji="0" lang="en-US" sz="1200" b="0" i="0" u="none" strike="noStrike" kern="1200" cap="none" spc="0" normalizeH="0" baseline="0" noProof="0" dirty="0">
               <a:ln>
@@ -2021,7 +2021,7 @@
           <a:p>
             <a:fld id="{38EEC551-8CDA-4EB6-89BB-2A86C9F091C8}" type="datetime8">
               <a:rPr lang="en-US" smtClean="0"/>
-              <a:t>5/20/2021 9:52 AM</a:t>
+              <a:t>5/20/2021 10:50 AM</a:t>
             </a:fld>
             <a:endParaRPr lang="en-US" dirty="0"/>
           </a:p>
@@ -22216,7 +22216,7 @@
               <a:defRPr/>
             </a:pPr>
             <a:r>
-              <a:rPr lang="en-US" sz="1100" kern="0" dirty="0">
+              <a:rPr lang="en-US" sz="1600" kern="0" dirty="0">
                 <a:solidFill>
                   <a:srgbClr val="FFFFFF"/>
                 </a:solidFill>
@@ -24511,12 +24511,31 @@
 </file>
 
 <file path=customXml/item1.xml><?xml version="1.0" encoding="utf-8"?>
-<?mso-contentType ?>
-<FormTemplates xmlns="http://schemas.microsoft.com/sharepoint/v3/contenttype/forms">
-  <Display>DocumentLibraryForm</Display>
-  <Edit>DocumentLibraryForm</Edit>
-  <New>DocumentLibraryForm</New>
-</FormTemplates>
+<p:properties xmlns:p="http://schemas.microsoft.com/office/2006/metadata/properties" xmlns:xsi="http://www.w3.org/2001/XMLSchema-instance" xmlns:pc="http://schemas.microsoft.com/office/infopath/2007/PartnerControls">
+  <documentManagement>
+    <_ip_UnifiedCompliancePolicyUIAction xmlns="http://schemas.microsoft.com/sharepoint/v3" xsi:nil="true"/>
+    <_ip_UnifiedCompliancePolicyProperties xmlns="http://schemas.microsoft.com/sharepoint/v3" xsi:nil="true"/>
+    <SharedWithUsers xmlns="b1dcf5e4-b140-464e-ad28-2eb3e755d828">
+      <UserInfo>
+        <DisplayName>Nati Nimni</DisplayName>
+        <AccountId>5713</AccountId>
+        <AccountType/>
+      </UserInfo>
+      <UserInfo>
+        <DisplayName>Heheng Li</DisplayName>
+        <AccountId>1938</AccountId>
+        <AccountType/>
+      </UserInfo>
+      <UserInfo>
+        <DisplayName>Josee Martens</DisplayName>
+        <AccountId>58</AccountId>
+        <AccountType/>
+      </UserInfo>
+    </SharedWithUsers>
+    <LastSharedByUser xmlns="ed478a9f-b709-4468-8a86-34ec96f55872">zhnan@microsoft.com</LastSharedByUser>
+    <LastSharedByTime xmlns="b1dcf5e4-b140-464e-ad28-2eb3e755d828">2017-04-22T00:50:26+00:00</LastSharedByTime>
+  </documentManagement>
+</p:properties>
 </file>
 
 <file path=customXml/item2.xml><?xml version="1.0" encoding="utf-8"?>
@@ -24721,37 +24740,29 @@
 </file>
 
 <file path=customXml/item3.xml><?xml version="1.0" encoding="utf-8"?>
-<p:properties xmlns:p="http://schemas.microsoft.com/office/2006/metadata/properties" xmlns:xsi="http://www.w3.org/2001/XMLSchema-instance" xmlns:pc="http://schemas.microsoft.com/office/infopath/2007/PartnerControls">
-  <documentManagement>
-    <_ip_UnifiedCompliancePolicyUIAction xmlns="http://schemas.microsoft.com/sharepoint/v3" xsi:nil="true"/>
-    <_ip_UnifiedCompliancePolicyProperties xmlns="http://schemas.microsoft.com/sharepoint/v3" xsi:nil="true"/>
-    <SharedWithUsers xmlns="b1dcf5e4-b140-464e-ad28-2eb3e755d828">
-      <UserInfo>
-        <DisplayName>Nati Nimni</DisplayName>
-        <AccountId>5713</AccountId>
-        <AccountType/>
-      </UserInfo>
-      <UserInfo>
-        <DisplayName>Heheng Li</DisplayName>
-        <AccountId>1938</AccountId>
-        <AccountType/>
-      </UserInfo>
-      <UserInfo>
-        <DisplayName>Josee Martens</DisplayName>
-        <AccountId>58</AccountId>
-        <AccountType/>
-      </UserInfo>
-    </SharedWithUsers>
-    <LastSharedByUser xmlns="ed478a9f-b709-4468-8a86-34ec96f55872">zhnan@microsoft.com</LastSharedByUser>
-    <LastSharedByTime xmlns="b1dcf5e4-b140-464e-ad28-2eb3e755d828">2017-04-22T00:50:26+00:00</LastSharedByTime>
-  </documentManagement>
-</p:properties>
+<?mso-contentType ?>
+<FormTemplates xmlns="http://schemas.microsoft.com/sharepoint/v3/contenttype/forms">
+  <Display>DocumentLibraryForm</Display>
+  <Edit>DocumentLibraryForm</Edit>
+  <New>DocumentLibraryForm</New>
+</FormTemplates>
 </file>
 
 <file path=customXml/itemProps1.xml><?xml version="1.0" encoding="utf-8"?>
-<ds:datastoreItem xmlns:ds="http://schemas.openxmlformats.org/officeDocument/2006/customXml" ds:itemID="{758FDAC0-319D-4A54-8D8E-1D42CB1F8004}">
+<ds:datastoreItem xmlns:ds="http://schemas.openxmlformats.org/officeDocument/2006/customXml" ds:itemID="{F990F116-B58F-4255-B05B-DA3808E0E5C6}">
   <ds:schemaRefs>
-    <ds:schemaRef ds:uri="http://schemas.microsoft.com/sharepoint/v3/contenttype/forms"/>
+    <ds:schemaRef ds:uri="http://purl.org/dc/dcmitype/"/>
+    <ds:schemaRef ds:uri="b1dcf5e4-b140-464e-ad28-2eb3e755d828"/>
+    <ds:schemaRef ds:uri="http://schemas.microsoft.com/office/2006/metadata/properties"/>
+    <ds:schemaRef ds:uri="ed478a9f-b709-4468-8a86-34ec96f55872"/>
+    <ds:schemaRef ds:uri="http://purl.org/dc/terms/"/>
+    <ds:schemaRef ds:uri="http://schemas.microsoft.com/sharepoint/v3"/>
+    <ds:schemaRef ds:uri="http://purl.org/dc/elements/1.1/"/>
+    <ds:schemaRef ds:uri="http://schemas.microsoft.com/office/2006/documentManagement/types"/>
+    <ds:schemaRef ds:uri="http://schemas.openxmlformats.org/package/2006/metadata/core-properties"/>
+    <ds:schemaRef ds:uri="http://schemas.microsoft.com/office/infopath/2007/PartnerControls"/>
+    <ds:schemaRef ds:uri="1f5ecd6e-98aa-4646-bfe6-99acd4bfa1f2"/>
+    <ds:schemaRef ds:uri="http://www.w3.org/XML/1998/namespace"/>
   </ds:schemaRefs>
 </ds:datastoreItem>
 </file>
@@ -24778,20 +24789,9 @@
 </file>
 
 <file path=customXml/itemProps3.xml><?xml version="1.0" encoding="utf-8"?>
-<ds:datastoreItem xmlns:ds="http://schemas.openxmlformats.org/officeDocument/2006/customXml" ds:itemID="{F990F116-B58F-4255-B05B-DA3808E0E5C6}">
+<ds:datastoreItem xmlns:ds="http://schemas.openxmlformats.org/officeDocument/2006/customXml" ds:itemID="{758FDAC0-319D-4A54-8D8E-1D42CB1F8004}">
   <ds:schemaRefs>
-    <ds:schemaRef ds:uri="http://purl.org/dc/dcmitype/"/>
-    <ds:schemaRef ds:uri="b1dcf5e4-b140-464e-ad28-2eb3e755d828"/>
-    <ds:schemaRef ds:uri="http://schemas.microsoft.com/office/2006/metadata/properties"/>
-    <ds:schemaRef ds:uri="ed478a9f-b709-4468-8a86-34ec96f55872"/>
-    <ds:schemaRef ds:uri="http://purl.org/dc/terms/"/>
-    <ds:schemaRef ds:uri="http://schemas.microsoft.com/sharepoint/v3"/>
-    <ds:schemaRef ds:uri="http://purl.org/dc/elements/1.1/"/>
-    <ds:schemaRef ds:uri="http://schemas.microsoft.com/office/2006/documentManagement/types"/>
-    <ds:schemaRef ds:uri="http://schemas.openxmlformats.org/package/2006/metadata/core-properties"/>
-    <ds:schemaRef ds:uri="http://schemas.microsoft.com/office/infopath/2007/PartnerControls"/>
-    <ds:schemaRef ds:uri="1f5ecd6e-98aa-4646-bfe6-99acd4bfa1f2"/>
-    <ds:schemaRef ds:uri="http://www.w3.org/XML/1998/namespace"/>
+    <ds:schemaRef ds:uri="http://schemas.microsoft.com/sharepoint/v3/contenttype/forms"/>
   </ds:schemaRefs>
 </ds:datastoreItem>
 </file>

</xml_diff>

<commit_message>
Fixing text in image
</commit_message>
<xml_diff>
--- a/image-sources/o16n-image-source-modern-policy-servicing.pptx
+++ b/image-sources/o16n-image-source-modern-policy-servicing.pptx
@@ -382,7 +382,7 @@
               <a:rPr lang="en-US" smtClean="0">
                 <a:latin typeface="Segoe UI" pitchFamily="34" charset="0"/>
               </a:rPr>
-              <a:t>5/20/2021 10:51 AM</a:t>
+              <a:t>5/24/2021 12:37 PM</a:t>
             </a:fld>
             <a:endParaRPr lang="en-US" dirty="0">
               <a:latin typeface="Segoe UI" pitchFamily="34" charset="0"/>
@@ -679,7 +679,7 @@
           <a:p>
             <a:fld id="{38EEC551-8CDA-4EB6-89BB-2A86C9F091C8}" type="datetime8">
               <a:rPr lang="en-US" smtClean="0"/>
-              <a:t>5/20/2021 10:50 AM</a:t>
+              <a:t>5/24/2021 12:36 PM</a:t>
             </a:fld>
             <a:endParaRPr lang="en-US" dirty="0"/>
           </a:p>
@@ -1071,7 +1071,7 @@
           <a:p>
             <a:fld id="{38EEC551-8CDA-4EB6-89BB-2A86C9F091C8}" type="datetime8">
               <a:rPr lang="en-US" smtClean="0"/>
-              <a:t>5/20/2021 10:50 AM</a:t>
+              <a:t>5/24/2021 12:36 PM</a:t>
             </a:fld>
             <a:endParaRPr lang="en-US" dirty="0"/>
           </a:p>
@@ -1379,7 +1379,7 @@
                 <a:tabLst/>
                 <a:defRPr/>
               </a:pPr>
-              <a:t>5/20/2021 10:50 AM</a:t>
+              <a:t>5/24/2021 12:36 PM</a:t>
             </a:fld>
             <a:endParaRPr kumimoji="0" lang="en-US" sz="1200" b="0" i="0" u="none" strike="noStrike" kern="1200" cap="none" spc="0" normalizeH="0" baseline="0" noProof="0" dirty="0">
               <a:ln>
@@ -1759,7 +1759,7 @@
                 <a:tabLst/>
                 <a:defRPr/>
               </a:pPr>
-              <a:t>5/20/2021 10:50 AM</a:t>
+              <a:t>5/24/2021 12:36 PM</a:t>
             </a:fld>
             <a:endParaRPr kumimoji="0" lang="en-US" sz="1200" b="0" i="0" u="none" strike="noStrike" kern="1200" cap="none" spc="0" normalizeH="0" baseline="0" noProof="0" dirty="0">
               <a:ln>
@@ -2021,7 +2021,7 @@
           <a:p>
             <a:fld id="{38EEC551-8CDA-4EB6-89BB-2A86C9F091C8}" type="datetime8">
               <a:rPr lang="en-US" smtClean="0"/>
-              <a:t>5/20/2021 10:50 AM</a:t>
+              <a:t>5/24/2021 12:36 PM</a:t>
             </a:fld>
             <a:endParaRPr lang="en-US" dirty="0"/>
           </a:p>
@@ -22216,7 +22216,7 @@
               <a:defRPr/>
             </a:pPr>
             <a:r>
-              <a:rPr lang="en-US" sz="1600" kern="0" dirty="0">
+              <a:rPr lang="en-US" sz="1100" kern="0" dirty="0">
                 <a:solidFill>
                   <a:srgbClr val="FFFFFF"/>
                 </a:solidFill>
@@ -24511,31 +24511,12 @@
 </file>
 
 <file path=customXml/item1.xml><?xml version="1.0" encoding="utf-8"?>
-<p:properties xmlns:p="http://schemas.microsoft.com/office/2006/metadata/properties" xmlns:xsi="http://www.w3.org/2001/XMLSchema-instance" xmlns:pc="http://schemas.microsoft.com/office/infopath/2007/PartnerControls">
-  <documentManagement>
-    <_ip_UnifiedCompliancePolicyUIAction xmlns="http://schemas.microsoft.com/sharepoint/v3" xsi:nil="true"/>
-    <_ip_UnifiedCompliancePolicyProperties xmlns="http://schemas.microsoft.com/sharepoint/v3" xsi:nil="true"/>
-    <SharedWithUsers xmlns="b1dcf5e4-b140-464e-ad28-2eb3e755d828">
-      <UserInfo>
-        <DisplayName>Nati Nimni</DisplayName>
-        <AccountId>5713</AccountId>
-        <AccountType/>
-      </UserInfo>
-      <UserInfo>
-        <DisplayName>Heheng Li</DisplayName>
-        <AccountId>1938</AccountId>
-        <AccountType/>
-      </UserInfo>
-      <UserInfo>
-        <DisplayName>Josee Martens</DisplayName>
-        <AccountId>58</AccountId>
-        <AccountType/>
-      </UserInfo>
-    </SharedWithUsers>
-    <LastSharedByUser xmlns="ed478a9f-b709-4468-8a86-34ec96f55872">zhnan@microsoft.com</LastSharedByUser>
-    <LastSharedByTime xmlns="b1dcf5e4-b140-464e-ad28-2eb3e755d828">2017-04-22T00:50:26+00:00</LastSharedByTime>
-  </documentManagement>
-</p:properties>
+<?mso-contentType ?>
+<FormTemplates xmlns="http://schemas.microsoft.com/sharepoint/v3/contenttype/forms">
+  <Display>DocumentLibraryForm</Display>
+  <Edit>DocumentLibraryForm</Edit>
+  <New>DocumentLibraryForm</New>
+</FormTemplates>
 </file>
 
 <file path=customXml/item2.xml><?xml version="1.0" encoding="utf-8"?>
@@ -24740,29 +24721,37 @@
 </file>
 
 <file path=customXml/item3.xml><?xml version="1.0" encoding="utf-8"?>
-<?mso-contentType ?>
-<FormTemplates xmlns="http://schemas.microsoft.com/sharepoint/v3/contenttype/forms">
-  <Display>DocumentLibraryForm</Display>
-  <Edit>DocumentLibraryForm</Edit>
-  <New>DocumentLibraryForm</New>
-</FormTemplates>
+<p:properties xmlns:p="http://schemas.microsoft.com/office/2006/metadata/properties" xmlns:xsi="http://www.w3.org/2001/XMLSchema-instance" xmlns:pc="http://schemas.microsoft.com/office/infopath/2007/PartnerControls">
+  <documentManagement>
+    <_ip_UnifiedCompliancePolicyUIAction xmlns="http://schemas.microsoft.com/sharepoint/v3" xsi:nil="true"/>
+    <_ip_UnifiedCompliancePolicyProperties xmlns="http://schemas.microsoft.com/sharepoint/v3" xsi:nil="true"/>
+    <SharedWithUsers xmlns="b1dcf5e4-b140-464e-ad28-2eb3e755d828">
+      <UserInfo>
+        <DisplayName>Nati Nimni</DisplayName>
+        <AccountId>5713</AccountId>
+        <AccountType/>
+      </UserInfo>
+      <UserInfo>
+        <DisplayName>Heheng Li</DisplayName>
+        <AccountId>1938</AccountId>
+        <AccountType/>
+      </UserInfo>
+      <UserInfo>
+        <DisplayName>Josee Martens</DisplayName>
+        <AccountId>58</AccountId>
+        <AccountType/>
+      </UserInfo>
+    </SharedWithUsers>
+    <LastSharedByUser xmlns="ed478a9f-b709-4468-8a86-34ec96f55872">zhnan@microsoft.com</LastSharedByUser>
+    <LastSharedByTime xmlns="b1dcf5e4-b140-464e-ad28-2eb3e755d828">2017-04-22T00:50:26+00:00</LastSharedByTime>
+  </documentManagement>
+</p:properties>
 </file>
 
 <file path=customXml/itemProps1.xml><?xml version="1.0" encoding="utf-8"?>
-<ds:datastoreItem xmlns:ds="http://schemas.openxmlformats.org/officeDocument/2006/customXml" ds:itemID="{F990F116-B58F-4255-B05B-DA3808E0E5C6}">
+<ds:datastoreItem xmlns:ds="http://schemas.openxmlformats.org/officeDocument/2006/customXml" ds:itemID="{758FDAC0-319D-4A54-8D8E-1D42CB1F8004}">
   <ds:schemaRefs>
-    <ds:schemaRef ds:uri="http://purl.org/dc/dcmitype/"/>
-    <ds:schemaRef ds:uri="b1dcf5e4-b140-464e-ad28-2eb3e755d828"/>
-    <ds:schemaRef ds:uri="http://schemas.microsoft.com/office/2006/metadata/properties"/>
-    <ds:schemaRef ds:uri="ed478a9f-b709-4468-8a86-34ec96f55872"/>
-    <ds:schemaRef ds:uri="http://purl.org/dc/terms/"/>
-    <ds:schemaRef ds:uri="http://schemas.microsoft.com/sharepoint/v3"/>
-    <ds:schemaRef ds:uri="http://purl.org/dc/elements/1.1/"/>
-    <ds:schemaRef ds:uri="http://schemas.microsoft.com/office/2006/documentManagement/types"/>
-    <ds:schemaRef ds:uri="http://schemas.openxmlformats.org/package/2006/metadata/core-properties"/>
-    <ds:schemaRef ds:uri="http://schemas.microsoft.com/office/infopath/2007/PartnerControls"/>
-    <ds:schemaRef ds:uri="1f5ecd6e-98aa-4646-bfe6-99acd4bfa1f2"/>
-    <ds:schemaRef ds:uri="http://www.w3.org/XML/1998/namespace"/>
+    <ds:schemaRef ds:uri="http://schemas.microsoft.com/sharepoint/v3/contenttype/forms"/>
   </ds:schemaRefs>
 </ds:datastoreItem>
 </file>
@@ -24789,9 +24778,20 @@
 </file>
 
 <file path=customXml/itemProps3.xml><?xml version="1.0" encoding="utf-8"?>
-<ds:datastoreItem xmlns:ds="http://schemas.openxmlformats.org/officeDocument/2006/customXml" ds:itemID="{758FDAC0-319D-4A54-8D8E-1D42CB1F8004}">
+<ds:datastoreItem xmlns:ds="http://schemas.openxmlformats.org/officeDocument/2006/customXml" ds:itemID="{F990F116-B58F-4255-B05B-DA3808E0E5C6}">
   <ds:schemaRefs>
-    <ds:schemaRef ds:uri="http://schemas.microsoft.com/sharepoint/v3/contenttype/forms"/>
+    <ds:schemaRef ds:uri="http://purl.org/dc/dcmitype/"/>
+    <ds:schemaRef ds:uri="b1dcf5e4-b140-464e-ad28-2eb3e755d828"/>
+    <ds:schemaRef ds:uri="http://schemas.microsoft.com/office/2006/metadata/properties"/>
+    <ds:schemaRef ds:uri="ed478a9f-b709-4468-8a86-34ec96f55872"/>
+    <ds:schemaRef ds:uri="http://purl.org/dc/terms/"/>
+    <ds:schemaRef ds:uri="http://schemas.microsoft.com/sharepoint/v3"/>
+    <ds:schemaRef ds:uri="http://purl.org/dc/elements/1.1/"/>
+    <ds:schemaRef ds:uri="http://schemas.microsoft.com/office/2006/documentManagement/types"/>
+    <ds:schemaRef ds:uri="http://schemas.openxmlformats.org/package/2006/metadata/core-properties"/>
+    <ds:schemaRef ds:uri="http://schemas.microsoft.com/office/infopath/2007/PartnerControls"/>
+    <ds:schemaRef ds:uri="1f5ecd6e-98aa-4646-bfe6-99acd4bfa1f2"/>
+    <ds:schemaRef ds:uri="http://www.w3.org/XML/1998/namespace"/>
   </ds:schemaRefs>
 </ds:datastoreItem>
 </file>

</xml_diff>

<commit_message>
MLServer: Change support end date to 7/1
</commit_message>
<xml_diff>
--- a/image-sources/o16n-image-source-modern-policy-servicing.pptx
+++ b/image-sources/o16n-image-source-modern-policy-servicing.pptx
@@ -382,7 +382,7 @@
               <a:rPr lang="en-US" smtClean="0">
                 <a:latin typeface="Segoe UI" pitchFamily="34" charset="0"/>
               </a:rPr>
-              <a:t>5/24/2021 12:37 PM</a:t>
+              <a:t>6/18/2021 3:56 PM</a:t>
             </a:fld>
             <a:endParaRPr lang="en-US" dirty="0">
               <a:latin typeface="Segoe UI" pitchFamily="34" charset="0"/>
@@ -679,7 +679,7 @@
           <a:p>
             <a:fld id="{38EEC551-8CDA-4EB6-89BB-2A86C9F091C8}" type="datetime8">
               <a:rPr lang="en-US" smtClean="0"/>
-              <a:t>5/24/2021 12:36 PM</a:t>
+              <a:t>6/18/2021 3:56 PM</a:t>
             </a:fld>
             <a:endParaRPr lang="en-US" dirty="0"/>
           </a:p>
@@ -1071,7 +1071,7 @@
           <a:p>
             <a:fld id="{38EEC551-8CDA-4EB6-89BB-2A86C9F091C8}" type="datetime8">
               <a:rPr lang="en-US" smtClean="0"/>
-              <a:t>5/24/2021 12:36 PM</a:t>
+              <a:t>6/18/2021 3:56 PM</a:t>
             </a:fld>
             <a:endParaRPr lang="en-US" dirty="0"/>
           </a:p>
@@ -1379,7 +1379,7 @@
                 <a:tabLst/>
                 <a:defRPr/>
               </a:pPr>
-              <a:t>5/24/2021 12:36 PM</a:t>
+              <a:t>6/18/2021 3:56 PM</a:t>
             </a:fld>
             <a:endParaRPr kumimoji="0" lang="en-US" sz="1200" b="0" i="0" u="none" strike="noStrike" kern="1200" cap="none" spc="0" normalizeH="0" baseline="0" noProof="0" dirty="0">
               <a:ln>
@@ -1759,7 +1759,7 @@
                 <a:tabLst/>
                 <a:defRPr/>
               </a:pPr>
-              <a:t>5/24/2021 12:36 PM</a:t>
+              <a:t>6/18/2021 3:56 PM</a:t>
             </a:fld>
             <a:endParaRPr kumimoji="0" lang="en-US" sz="1200" b="0" i="0" u="none" strike="noStrike" kern="1200" cap="none" spc="0" normalizeH="0" baseline="0" noProof="0" dirty="0">
               <a:ln>
@@ -2021,7 +2021,7 @@
           <a:p>
             <a:fld id="{38EEC551-8CDA-4EB6-89BB-2A86C9F091C8}" type="datetime8">
               <a:rPr lang="en-US" smtClean="0"/>
-              <a:t>5/24/2021 12:36 PM</a:t>
+              <a:t>6/18/2021 3:56 PM</a:t>
             </a:fld>
             <a:endParaRPr lang="en-US" dirty="0"/>
           </a:p>
@@ -19110,7 +19110,7 @@
         </p:nvSpPr>
         <p:spPr bwMode="auto">
           <a:xfrm>
-            <a:off x="820744" y="1183727"/>
+            <a:off x="173472" y="700589"/>
             <a:ext cx="12763193" cy="914400"/>
           </a:xfrm>
           <a:prstGeom prst="rect">
@@ -19196,7 +19196,7 @@
         </p:nvSpPr>
         <p:spPr bwMode="auto">
           <a:xfrm>
-            <a:off x="820744" y="2213793"/>
+            <a:off x="173472" y="1730655"/>
             <a:ext cx="12763193" cy="914400"/>
           </a:xfrm>
           <a:prstGeom prst="rect">
@@ -19282,7 +19282,7 @@
         </p:nvSpPr>
         <p:spPr bwMode="auto">
           <a:xfrm>
-            <a:off x="820744" y="3243859"/>
+            <a:off x="173472" y="2760721"/>
             <a:ext cx="12763193" cy="914400"/>
           </a:xfrm>
           <a:prstGeom prst="rect">
@@ -19368,7 +19368,7 @@
         </p:nvSpPr>
         <p:spPr bwMode="auto">
           <a:xfrm>
-            <a:off x="820744" y="4273925"/>
+            <a:off x="173472" y="3790787"/>
             <a:ext cx="12763193" cy="914400"/>
           </a:xfrm>
           <a:prstGeom prst="rect">
@@ -19454,7 +19454,7 @@
         </p:nvSpPr>
         <p:spPr bwMode="auto">
           <a:xfrm>
-            <a:off x="820744" y="5303989"/>
+            <a:off x="173472" y="4820851"/>
             <a:ext cx="12763193" cy="914400"/>
           </a:xfrm>
           <a:prstGeom prst="rect">
@@ -19540,7 +19540,7 @@
         </p:nvSpPr>
         <p:spPr>
           <a:xfrm>
-            <a:off x="1295211" y="781060"/>
+            <a:off x="647939" y="297922"/>
             <a:ext cx="1323041" cy="452044"/>
           </a:xfrm>
           <a:prstGeom prst="rect">
@@ -19589,7 +19589,7 @@
         </p:nvSpPr>
         <p:spPr>
           <a:xfrm>
-            <a:off x="2338204" y="794294"/>
+            <a:off x="1690932" y="311156"/>
             <a:ext cx="1323041" cy="452044"/>
           </a:xfrm>
           <a:prstGeom prst="rect">
@@ -19638,7 +19638,7 @@
         </p:nvSpPr>
         <p:spPr>
           <a:xfrm>
-            <a:off x="3381197" y="803123"/>
+            <a:off x="2733925" y="319985"/>
             <a:ext cx="1323041" cy="452044"/>
           </a:xfrm>
           <a:prstGeom prst="rect">
@@ -19687,7 +19687,7 @@
         </p:nvSpPr>
         <p:spPr>
           <a:xfrm>
-            <a:off x="4424190" y="794145"/>
+            <a:off x="3776918" y="311007"/>
             <a:ext cx="1323041" cy="452044"/>
           </a:xfrm>
           <a:prstGeom prst="rect">
@@ -19736,7 +19736,7 @@
         </p:nvSpPr>
         <p:spPr>
           <a:xfrm>
-            <a:off x="5467183" y="781059"/>
+            <a:off x="4819911" y="297921"/>
             <a:ext cx="1323041" cy="452044"/>
           </a:xfrm>
           <a:prstGeom prst="rect">
@@ -19785,7 +19785,7 @@
         </p:nvSpPr>
         <p:spPr>
           <a:xfrm>
-            <a:off x="3395683" y="500278"/>
+            <a:off x="2748411" y="17140"/>
             <a:ext cx="1323041" cy="452044"/>
           </a:xfrm>
           <a:prstGeom prst="rect">
@@ -19835,7 +19835,7 @@
         </p:nvSpPr>
         <p:spPr>
           <a:xfrm>
-            <a:off x="5481716" y="500278"/>
+            <a:off x="4834444" y="17140"/>
             <a:ext cx="1323041" cy="452044"/>
           </a:xfrm>
           <a:prstGeom prst="rect">
@@ -19885,7 +19885,7 @@
         </p:nvSpPr>
         <p:spPr>
           <a:xfrm>
-            <a:off x="1309650" y="500278"/>
+            <a:off x="662378" y="17140"/>
             <a:ext cx="1323041" cy="452044"/>
           </a:xfrm>
           <a:prstGeom prst="rect">
@@ -19937,7 +19937,7 @@
         </p:nvCxnSpPr>
         <p:spPr>
           <a:xfrm>
-            <a:off x="7175723" y="1173339"/>
+            <a:off x="6528451" y="690201"/>
             <a:ext cx="0" cy="5045055"/>
           </a:xfrm>
           <a:prstGeom prst="line">
@@ -19984,7 +19984,7 @@
         </p:nvSpPr>
         <p:spPr>
           <a:xfrm>
-            <a:off x="6510176" y="800063"/>
+            <a:off x="5862904" y="316925"/>
             <a:ext cx="1323041" cy="452044"/>
           </a:xfrm>
           <a:prstGeom prst="rect">
@@ -20035,7 +20035,7 @@
         </p:nvCxnSpPr>
         <p:spPr>
           <a:xfrm>
-            <a:off x="1960863" y="1155469"/>
+            <a:off x="1313591" y="672331"/>
             <a:ext cx="0" cy="5062925"/>
           </a:xfrm>
           <a:prstGeom prst="line">
@@ -20084,7 +20084,7 @@
         </p:nvCxnSpPr>
         <p:spPr>
           <a:xfrm>
-            <a:off x="5089779" y="1166191"/>
+            <a:off x="4442507" y="683053"/>
             <a:ext cx="0" cy="5052203"/>
           </a:xfrm>
           <a:prstGeom prst="line">
@@ -20133,7 +20133,7 @@
         </p:nvCxnSpPr>
         <p:spPr>
           <a:xfrm>
-            <a:off x="3003835" y="1159042"/>
+            <a:off x="2356563" y="675904"/>
             <a:ext cx="0" cy="5059351"/>
           </a:xfrm>
           <a:prstGeom prst="line">
@@ -20182,7 +20182,7 @@
         </p:nvCxnSpPr>
         <p:spPr>
           <a:xfrm>
-            <a:off x="4046807" y="1162617"/>
+            <a:off x="3399535" y="679479"/>
             <a:ext cx="0" cy="5055777"/>
           </a:xfrm>
           <a:prstGeom prst="line">
@@ -20231,7 +20231,7 @@
         </p:nvCxnSpPr>
         <p:spPr>
           <a:xfrm>
-            <a:off x="6132751" y="1169764"/>
+            <a:off x="5485479" y="686626"/>
             <a:ext cx="0" cy="5048629"/>
           </a:xfrm>
           <a:prstGeom prst="line">
@@ -20278,7 +20278,7 @@
         </p:nvSpPr>
         <p:spPr>
           <a:xfrm>
-            <a:off x="820740" y="1351781"/>
+            <a:off x="173468" y="868643"/>
             <a:ext cx="1445652" cy="578305"/>
           </a:xfrm>
           <a:prstGeom prst="rect">
@@ -20327,7 +20327,7 @@
         </p:nvSpPr>
         <p:spPr>
           <a:xfrm>
-            <a:off x="820740" y="2381846"/>
+            <a:off x="173468" y="1898708"/>
             <a:ext cx="1445652" cy="578305"/>
           </a:xfrm>
           <a:prstGeom prst="rect">
@@ -20376,7 +20376,7 @@
         </p:nvSpPr>
         <p:spPr>
           <a:xfrm>
-            <a:off x="820740" y="3411912"/>
+            <a:off x="173468" y="2928774"/>
             <a:ext cx="1445652" cy="578305"/>
           </a:xfrm>
           <a:prstGeom prst="rect">
@@ -20425,7 +20425,7 @@
         </p:nvSpPr>
         <p:spPr>
           <a:xfrm>
-            <a:off x="820740" y="4456119"/>
+            <a:off x="173468" y="3972981"/>
             <a:ext cx="1445652" cy="578305"/>
           </a:xfrm>
           <a:prstGeom prst="rect">
@@ -20474,7 +20474,7 @@
         </p:nvSpPr>
         <p:spPr>
           <a:xfrm>
-            <a:off x="820740" y="5486183"/>
+            <a:off x="173468" y="5003045"/>
             <a:ext cx="1445652" cy="578305"/>
           </a:xfrm>
           <a:prstGeom prst="rect">
@@ -20529,7 +20529,7 @@
         </p:nvSpPr>
         <p:spPr>
           <a:xfrm>
-            <a:off x="7553169" y="788673"/>
+            <a:off x="6905897" y="305535"/>
             <a:ext cx="1323041" cy="452044"/>
           </a:xfrm>
           <a:prstGeom prst="rect">
@@ -20578,7 +20578,7 @@
         </p:nvSpPr>
         <p:spPr>
           <a:xfrm>
-            <a:off x="7567749" y="500278"/>
+            <a:off x="6920477" y="17140"/>
             <a:ext cx="1323041" cy="452044"/>
           </a:xfrm>
           <a:prstGeom prst="rect">
@@ -20630,7 +20630,7 @@
         </p:nvCxnSpPr>
         <p:spPr>
           <a:xfrm>
-            <a:off x="9261667" y="1174566"/>
+            <a:off x="8614395" y="691428"/>
             <a:ext cx="0" cy="5043827"/>
           </a:xfrm>
           <a:prstGeom prst="line">
@@ -20677,7 +20677,7 @@
         </p:nvSpPr>
         <p:spPr>
           <a:xfrm>
-            <a:off x="8596162" y="807677"/>
+            <a:off x="7948890" y="324539"/>
             <a:ext cx="1323041" cy="452044"/>
           </a:xfrm>
           <a:prstGeom prst="rect">
@@ -20728,7 +20728,7 @@
         </p:nvCxnSpPr>
         <p:spPr>
           <a:xfrm>
-            <a:off x="8218695" y="1170995"/>
+            <a:off x="7571423" y="687857"/>
             <a:ext cx="0" cy="5047399"/>
           </a:xfrm>
           <a:prstGeom prst="line">
@@ -20775,7 +20775,7 @@
         </p:nvSpPr>
         <p:spPr>
           <a:xfrm>
-            <a:off x="9639155" y="767115"/>
+            <a:off x="8991883" y="283977"/>
             <a:ext cx="1323041" cy="452044"/>
           </a:xfrm>
           <a:prstGeom prst="rect">
@@ -20824,7 +20824,7 @@
         </p:nvSpPr>
         <p:spPr>
           <a:xfrm>
-            <a:off x="9653784" y="500278"/>
+            <a:off x="9006512" y="17140"/>
             <a:ext cx="1323041" cy="452044"/>
           </a:xfrm>
           <a:prstGeom prst="rect">
@@ -20876,7 +20876,7 @@
         </p:nvCxnSpPr>
         <p:spPr>
           <a:xfrm>
-            <a:off x="11347609" y="1150664"/>
+            <a:off x="10700337" y="667526"/>
             <a:ext cx="0" cy="5067729"/>
           </a:xfrm>
           <a:prstGeom prst="line">
@@ -20923,7 +20923,7 @@
         </p:nvSpPr>
         <p:spPr>
           <a:xfrm>
-            <a:off x="10682146" y="787396"/>
+            <a:off x="10034874" y="304258"/>
             <a:ext cx="1323041" cy="452044"/>
           </a:xfrm>
           <a:prstGeom prst="rect">
@@ -20974,7 +20974,7 @@
         </p:nvCxnSpPr>
         <p:spPr>
           <a:xfrm>
-            <a:off x="10304639" y="1147091"/>
+            <a:off x="9657367" y="663953"/>
             <a:ext cx="0" cy="5071303"/>
           </a:xfrm>
           <a:prstGeom prst="line">
@@ -21021,7 +21021,7 @@
         </p:nvGrpSpPr>
         <p:grpSpPr>
           <a:xfrm>
-            <a:off x="1818757" y="1351780"/>
+            <a:off x="1171485" y="868642"/>
             <a:ext cx="4313999" cy="578211"/>
             <a:chOff x="2984325" y="784386"/>
             <a:chExt cx="4313999" cy="578211"/>
@@ -21287,7 +21287,7 @@
         </p:nvGrpSpPr>
         <p:grpSpPr>
           <a:xfrm>
-            <a:off x="2597943" y="2390621"/>
+            <a:off x="1950671" y="1907483"/>
             <a:ext cx="4313999" cy="578211"/>
             <a:chOff x="2984325" y="784386"/>
             <a:chExt cx="4313999" cy="578211"/>
@@ -21553,7 +21553,7 @@
         </p:nvGrpSpPr>
         <p:grpSpPr>
           <a:xfrm>
-            <a:off x="3527895" y="3411912"/>
+            <a:off x="2880623" y="2928774"/>
             <a:ext cx="4313999" cy="578211"/>
             <a:chOff x="2984325" y="784386"/>
             <a:chExt cx="4313999" cy="578211"/>
@@ -21819,7 +21819,7 @@
         </p:nvGrpSpPr>
         <p:grpSpPr>
           <a:xfrm>
-            <a:off x="4262467" y="4442024"/>
+            <a:off x="3615195" y="3958886"/>
             <a:ext cx="4313999" cy="578211"/>
             <a:chOff x="2984325" y="784386"/>
             <a:chExt cx="4313999" cy="578211"/>
@@ -22085,7 +22085,7 @@
         </p:nvSpPr>
         <p:spPr bwMode="auto">
           <a:xfrm>
-            <a:off x="7183704" y="5490490"/>
+            <a:off x="6536432" y="5007352"/>
             <a:ext cx="2086257" cy="578210"/>
           </a:xfrm>
           <a:prstGeom prst="rect">
@@ -22164,8 +22164,8 @@
         </p:nvSpPr>
         <p:spPr bwMode="auto">
           <a:xfrm>
-            <a:off x="9269960" y="5490491"/>
-            <a:ext cx="4036465" cy="578210"/>
+            <a:off x="8622688" y="5007353"/>
+            <a:ext cx="4163148" cy="578210"/>
           </a:xfrm>
           <a:prstGeom prst="rect">
             <a:avLst/>
@@ -22243,7 +22243,7 @@
         </p:nvSpPr>
         <p:spPr bwMode="auto">
           <a:xfrm>
-            <a:off x="7041906" y="5639708"/>
+            <a:off x="6394634" y="5156570"/>
             <a:ext cx="279781" cy="279781"/>
           </a:xfrm>
           <a:prstGeom prst="diamond">
@@ -22330,7 +22330,7 @@
         </p:nvSpPr>
         <p:spPr>
           <a:xfrm>
-            <a:off x="10683769" y="790537"/>
+            <a:off x="10036497" y="307399"/>
             <a:ext cx="1323041" cy="452044"/>
           </a:xfrm>
           <a:prstGeom prst="rect">
@@ -22379,7 +22379,7 @@
         </p:nvSpPr>
         <p:spPr>
           <a:xfrm>
-            <a:off x="11726762" y="749975"/>
+            <a:off x="11079490" y="266837"/>
             <a:ext cx="1323041" cy="452044"/>
           </a:xfrm>
           <a:prstGeom prst="rect">
@@ -22428,7 +22428,7 @@
         </p:nvSpPr>
         <p:spPr>
           <a:xfrm>
-            <a:off x="11741391" y="483138"/>
+            <a:off x="11094119" y="0"/>
             <a:ext cx="1323041" cy="452044"/>
           </a:xfrm>
           <a:prstGeom prst="rect">
@@ -22478,7 +22478,7 @@
         </p:nvSpPr>
         <p:spPr>
           <a:xfrm>
-            <a:off x="12769748" y="770256"/>
+            <a:off x="12122476" y="287118"/>
             <a:ext cx="1323041" cy="452044"/>
           </a:xfrm>
           <a:prstGeom prst="rect">
@@ -22529,7 +22529,7 @@
         </p:nvCxnSpPr>
         <p:spPr>
           <a:xfrm>
-            <a:off x="11347168" y="1149471"/>
+            <a:off x="10699896" y="666333"/>
             <a:ext cx="0" cy="5043827"/>
           </a:xfrm>
           <a:prstGeom prst="line">
@@ -22578,7 +22578,7 @@
         </p:nvCxnSpPr>
         <p:spPr>
           <a:xfrm>
-            <a:off x="13433110" y="1125565"/>
+            <a:off x="12785838" y="642427"/>
             <a:ext cx="0" cy="5067729"/>
           </a:xfrm>
           <a:prstGeom prst="line">
@@ -22627,7 +22627,7 @@
         </p:nvCxnSpPr>
         <p:spPr>
           <a:xfrm>
-            <a:off x="12390140" y="1121996"/>
+            <a:off x="11742868" y="638858"/>
             <a:ext cx="0" cy="5071303"/>
           </a:xfrm>
           <a:prstGeom prst="line">
@@ -22734,7 +22734,7 @@
           <p:nvPr>
             <p:extLst>
               <p:ext uri="{D42A27DB-BD31-4B8C-83A1-F6EECF244321}">
-                <p14:modId xmlns:p14="http://schemas.microsoft.com/office/powerpoint/2010/main" val="4210659148"/>
+                <p14:modId xmlns:p14="http://schemas.microsoft.com/office/powerpoint/2010/main" val="50686073"/>
               </p:ext>
             </p:extLst>
           </p:nvPr>
@@ -23579,7 +23579,7 @@
                     <a:p>
                       <a:r>
                         <a:rPr lang="en-US" sz="1800" dirty="0"/>
-                        <a:t>6/1/2022</a:t>
+                        <a:t>7/1/2022</a:t>
                       </a:r>
                     </a:p>
                   </a:txBody>
@@ -24511,12 +24511,31 @@
 </file>
 
 <file path=customXml/item1.xml><?xml version="1.0" encoding="utf-8"?>
-<?mso-contentType ?>
-<FormTemplates xmlns="http://schemas.microsoft.com/sharepoint/v3/contenttype/forms">
-  <Display>DocumentLibraryForm</Display>
-  <Edit>DocumentLibraryForm</Edit>
-  <New>DocumentLibraryForm</New>
-</FormTemplates>
+<p:properties xmlns:p="http://schemas.microsoft.com/office/2006/metadata/properties" xmlns:xsi="http://www.w3.org/2001/XMLSchema-instance" xmlns:pc="http://schemas.microsoft.com/office/infopath/2007/PartnerControls">
+  <documentManagement>
+    <_ip_UnifiedCompliancePolicyUIAction xmlns="http://schemas.microsoft.com/sharepoint/v3" xsi:nil="true"/>
+    <_ip_UnifiedCompliancePolicyProperties xmlns="http://schemas.microsoft.com/sharepoint/v3" xsi:nil="true"/>
+    <SharedWithUsers xmlns="b1dcf5e4-b140-464e-ad28-2eb3e755d828">
+      <UserInfo>
+        <DisplayName>Nati Nimni</DisplayName>
+        <AccountId>5713</AccountId>
+        <AccountType/>
+      </UserInfo>
+      <UserInfo>
+        <DisplayName>Heheng Li</DisplayName>
+        <AccountId>1938</AccountId>
+        <AccountType/>
+      </UserInfo>
+      <UserInfo>
+        <DisplayName>Josee Martens</DisplayName>
+        <AccountId>58</AccountId>
+        <AccountType/>
+      </UserInfo>
+    </SharedWithUsers>
+    <LastSharedByUser xmlns="ed478a9f-b709-4468-8a86-34ec96f55872">zhnan@microsoft.com</LastSharedByUser>
+    <LastSharedByTime xmlns="b1dcf5e4-b140-464e-ad28-2eb3e755d828">2017-04-22T00:50:26+00:00</LastSharedByTime>
+  </documentManagement>
+</p:properties>
 </file>
 
 <file path=customXml/item2.xml><?xml version="1.0" encoding="utf-8"?>
@@ -24721,37 +24740,29 @@
 </file>
 
 <file path=customXml/item3.xml><?xml version="1.0" encoding="utf-8"?>
-<p:properties xmlns:p="http://schemas.microsoft.com/office/2006/metadata/properties" xmlns:xsi="http://www.w3.org/2001/XMLSchema-instance" xmlns:pc="http://schemas.microsoft.com/office/infopath/2007/PartnerControls">
-  <documentManagement>
-    <_ip_UnifiedCompliancePolicyUIAction xmlns="http://schemas.microsoft.com/sharepoint/v3" xsi:nil="true"/>
-    <_ip_UnifiedCompliancePolicyProperties xmlns="http://schemas.microsoft.com/sharepoint/v3" xsi:nil="true"/>
-    <SharedWithUsers xmlns="b1dcf5e4-b140-464e-ad28-2eb3e755d828">
-      <UserInfo>
-        <DisplayName>Nati Nimni</DisplayName>
-        <AccountId>5713</AccountId>
-        <AccountType/>
-      </UserInfo>
-      <UserInfo>
-        <DisplayName>Heheng Li</DisplayName>
-        <AccountId>1938</AccountId>
-        <AccountType/>
-      </UserInfo>
-      <UserInfo>
-        <DisplayName>Josee Martens</DisplayName>
-        <AccountId>58</AccountId>
-        <AccountType/>
-      </UserInfo>
-    </SharedWithUsers>
-    <LastSharedByUser xmlns="ed478a9f-b709-4468-8a86-34ec96f55872">zhnan@microsoft.com</LastSharedByUser>
-    <LastSharedByTime xmlns="b1dcf5e4-b140-464e-ad28-2eb3e755d828">2017-04-22T00:50:26+00:00</LastSharedByTime>
-  </documentManagement>
-</p:properties>
+<?mso-contentType ?>
+<FormTemplates xmlns="http://schemas.microsoft.com/sharepoint/v3/contenttype/forms">
+  <Display>DocumentLibraryForm</Display>
+  <Edit>DocumentLibraryForm</Edit>
+  <New>DocumentLibraryForm</New>
+</FormTemplates>
 </file>
 
 <file path=customXml/itemProps1.xml><?xml version="1.0" encoding="utf-8"?>
-<ds:datastoreItem xmlns:ds="http://schemas.openxmlformats.org/officeDocument/2006/customXml" ds:itemID="{758FDAC0-319D-4A54-8D8E-1D42CB1F8004}">
+<ds:datastoreItem xmlns:ds="http://schemas.openxmlformats.org/officeDocument/2006/customXml" ds:itemID="{F990F116-B58F-4255-B05B-DA3808E0E5C6}">
   <ds:schemaRefs>
-    <ds:schemaRef ds:uri="http://schemas.microsoft.com/sharepoint/v3/contenttype/forms"/>
+    <ds:schemaRef ds:uri="http://purl.org/dc/dcmitype/"/>
+    <ds:schemaRef ds:uri="b1dcf5e4-b140-464e-ad28-2eb3e755d828"/>
+    <ds:schemaRef ds:uri="http://schemas.microsoft.com/office/2006/metadata/properties"/>
+    <ds:schemaRef ds:uri="ed478a9f-b709-4468-8a86-34ec96f55872"/>
+    <ds:schemaRef ds:uri="http://purl.org/dc/terms/"/>
+    <ds:schemaRef ds:uri="http://schemas.microsoft.com/sharepoint/v3"/>
+    <ds:schemaRef ds:uri="http://purl.org/dc/elements/1.1/"/>
+    <ds:schemaRef ds:uri="http://schemas.microsoft.com/office/2006/documentManagement/types"/>
+    <ds:schemaRef ds:uri="http://schemas.openxmlformats.org/package/2006/metadata/core-properties"/>
+    <ds:schemaRef ds:uri="http://schemas.microsoft.com/office/infopath/2007/PartnerControls"/>
+    <ds:schemaRef ds:uri="1f5ecd6e-98aa-4646-bfe6-99acd4bfa1f2"/>
+    <ds:schemaRef ds:uri="http://www.w3.org/XML/1998/namespace"/>
   </ds:schemaRefs>
 </ds:datastoreItem>
 </file>
@@ -24778,20 +24789,9 @@
 </file>
 
 <file path=customXml/itemProps3.xml><?xml version="1.0" encoding="utf-8"?>
-<ds:datastoreItem xmlns:ds="http://schemas.openxmlformats.org/officeDocument/2006/customXml" ds:itemID="{F990F116-B58F-4255-B05B-DA3808E0E5C6}">
+<ds:datastoreItem xmlns:ds="http://schemas.openxmlformats.org/officeDocument/2006/customXml" ds:itemID="{758FDAC0-319D-4A54-8D8E-1D42CB1F8004}">
   <ds:schemaRefs>
-    <ds:schemaRef ds:uri="http://purl.org/dc/dcmitype/"/>
-    <ds:schemaRef ds:uri="b1dcf5e4-b140-464e-ad28-2eb3e755d828"/>
-    <ds:schemaRef ds:uri="http://schemas.microsoft.com/office/2006/metadata/properties"/>
-    <ds:schemaRef ds:uri="ed478a9f-b709-4468-8a86-34ec96f55872"/>
-    <ds:schemaRef ds:uri="http://purl.org/dc/terms/"/>
-    <ds:schemaRef ds:uri="http://schemas.microsoft.com/sharepoint/v3"/>
-    <ds:schemaRef ds:uri="http://purl.org/dc/elements/1.1/"/>
-    <ds:schemaRef ds:uri="http://schemas.microsoft.com/office/2006/documentManagement/types"/>
-    <ds:schemaRef ds:uri="http://schemas.openxmlformats.org/package/2006/metadata/core-properties"/>
-    <ds:schemaRef ds:uri="http://schemas.microsoft.com/office/infopath/2007/PartnerControls"/>
-    <ds:schemaRef ds:uri="1f5ecd6e-98aa-4646-bfe6-99acd4bfa1f2"/>
-    <ds:schemaRef ds:uri="http://www.w3.org/XML/1998/namespace"/>
+    <ds:schemaRef ds:uri="http://schemas.microsoft.com/sharepoint/v3/contenttype/forms"/>
   </ds:schemaRefs>
 </ds:datastoreItem>
 </file>

</xml_diff>